<commit_message>
udpate some function and add test
</commit_message>
<xml_diff>
--- a/study/inteSIN_study.pptx
+++ b/study/inteSIN_study.pptx
@@ -266,7 +266,7 @@
           <a:p>
             <a:fld id="{BF75B0C6-59F4-4046-8429-59472FF3BA33}" type="datetimeFigureOut">
               <a:rPr lang="zh-CN" altLang="en-US" smtClean="0"/>
-              <a:t>2024/3/13</a:t>
+              <a:t>2024/4/7</a:t>
             </a:fld>
             <a:endParaRPr lang="zh-CN" altLang="en-US"/>
           </a:p>
@@ -464,7 +464,7 @@
           <a:p>
             <a:fld id="{BF75B0C6-59F4-4046-8429-59472FF3BA33}" type="datetimeFigureOut">
               <a:rPr lang="zh-CN" altLang="en-US" smtClean="0"/>
-              <a:t>2024/3/13</a:t>
+              <a:t>2024/4/7</a:t>
             </a:fld>
             <a:endParaRPr lang="zh-CN" altLang="en-US"/>
           </a:p>
@@ -672,7 +672,7 @@
           <a:p>
             <a:fld id="{BF75B0C6-59F4-4046-8429-59472FF3BA33}" type="datetimeFigureOut">
               <a:rPr lang="zh-CN" altLang="en-US" smtClean="0"/>
-              <a:t>2024/3/13</a:t>
+              <a:t>2024/4/7</a:t>
             </a:fld>
             <a:endParaRPr lang="zh-CN" altLang="en-US"/>
           </a:p>
@@ -870,7 +870,7 @@
           <a:p>
             <a:fld id="{BF75B0C6-59F4-4046-8429-59472FF3BA33}" type="datetimeFigureOut">
               <a:rPr lang="zh-CN" altLang="en-US" smtClean="0"/>
-              <a:t>2024/3/13</a:t>
+              <a:t>2024/4/7</a:t>
             </a:fld>
             <a:endParaRPr lang="zh-CN" altLang="en-US"/>
           </a:p>
@@ -1145,7 +1145,7 @@
           <a:p>
             <a:fld id="{BF75B0C6-59F4-4046-8429-59472FF3BA33}" type="datetimeFigureOut">
               <a:rPr lang="zh-CN" altLang="en-US" smtClean="0"/>
-              <a:t>2024/3/13</a:t>
+              <a:t>2024/4/7</a:t>
             </a:fld>
             <a:endParaRPr lang="zh-CN" altLang="en-US"/>
           </a:p>
@@ -1410,7 +1410,7 @@
           <a:p>
             <a:fld id="{BF75B0C6-59F4-4046-8429-59472FF3BA33}" type="datetimeFigureOut">
               <a:rPr lang="zh-CN" altLang="en-US" smtClean="0"/>
-              <a:t>2024/3/13</a:t>
+              <a:t>2024/4/7</a:t>
             </a:fld>
             <a:endParaRPr lang="zh-CN" altLang="en-US"/>
           </a:p>
@@ -1822,7 +1822,7 @@
           <a:p>
             <a:fld id="{BF75B0C6-59F4-4046-8429-59472FF3BA33}" type="datetimeFigureOut">
               <a:rPr lang="zh-CN" altLang="en-US" smtClean="0"/>
-              <a:t>2024/3/13</a:t>
+              <a:t>2024/4/7</a:t>
             </a:fld>
             <a:endParaRPr lang="zh-CN" altLang="en-US"/>
           </a:p>
@@ -1963,7 +1963,7 @@
           <a:p>
             <a:fld id="{BF75B0C6-59F4-4046-8429-59472FF3BA33}" type="datetimeFigureOut">
               <a:rPr lang="zh-CN" altLang="en-US" smtClean="0"/>
-              <a:t>2024/3/13</a:t>
+              <a:t>2024/4/7</a:t>
             </a:fld>
             <a:endParaRPr lang="zh-CN" altLang="en-US"/>
           </a:p>
@@ -2076,7 +2076,7 @@
           <a:p>
             <a:fld id="{BF75B0C6-59F4-4046-8429-59472FF3BA33}" type="datetimeFigureOut">
               <a:rPr lang="zh-CN" altLang="en-US" smtClean="0"/>
-              <a:t>2024/3/13</a:t>
+              <a:t>2024/4/7</a:t>
             </a:fld>
             <a:endParaRPr lang="zh-CN" altLang="en-US"/>
           </a:p>
@@ -2387,7 +2387,7 @@
           <a:p>
             <a:fld id="{BF75B0C6-59F4-4046-8429-59472FF3BA33}" type="datetimeFigureOut">
               <a:rPr lang="zh-CN" altLang="en-US" smtClean="0"/>
-              <a:t>2024/3/13</a:t>
+              <a:t>2024/4/7</a:t>
             </a:fld>
             <a:endParaRPr lang="zh-CN" altLang="en-US"/>
           </a:p>
@@ -2675,7 +2675,7 @@
           <a:p>
             <a:fld id="{BF75B0C6-59F4-4046-8429-59472FF3BA33}" type="datetimeFigureOut">
               <a:rPr lang="zh-CN" altLang="en-US" smtClean="0"/>
-              <a:t>2024/3/13</a:t>
+              <a:t>2024/4/7</a:t>
             </a:fld>
             <a:endParaRPr lang="zh-CN" altLang="en-US"/>
           </a:p>
@@ -2916,7 +2916,7 @@
           <a:p>
             <a:fld id="{BF75B0C6-59F4-4046-8429-59472FF3BA33}" type="datetimeFigureOut">
               <a:rPr lang="zh-CN" altLang="en-US" smtClean="0"/>
-              <a:t>2024/3/13</a:t>
+              <a:t>2024/4/7</a:t>
             </a:fld>
             <a:endParaRPr lang="zh-CN" altLang="en-US"/>
           </a:p>
@@ -3455,6 +3455,36 @@
           <a:chExt cx="0" cy="0"/>
         </a:xfrm>
       </p:grpSpPr>
+      <p:pic>
+        <p:nvPicPr>
+          <p:cNvPr id="3" name="图片 2">
+            <a:extLst>
+              <a:ext uri="{FF2B5EF4-FFF2-40B4-BE49-F238E27FC236}">
+                <a16:creationId xmlns:a16="http://schemas.microsoft.com/office/drawing/2014/main" id="{695D817A-0F26-FC2D-B99E-3A70B6DC007F}"/>
+              </a:ext>
+            </a:extLst>
+          </p:cNvPr>
+          <p:cNvPicPr>
+            <a:picLocks noChangeAspect="1"/>
+          </p:cNvPicPr>
+          <p:nvPr/>
+        </p:nvPicPr>
+        <p:blipFill>
+          <a:blip r:embed="rId2"/>
+          <a:stretch>
+            <a:fillRect/>
+          </a:stretch>
+        </p:blipFill>
+        <p:spPr>
+          <a:xfrm>
+            <a:off x="129514" y="457199"/>
+            <a:ext cx="12062485" cy="6008109"/>
+          </a:xfrm>
+          <a:prstGeom prst="rect">
+            <a:avLst/>
+          </a:prstGeom>
+        </p:spPr>
+      </p:pic>
     </p:spTree>
     <p:extLst>
       <p:ext uri="{BB962C8B-B14F-4D97-AF65-F5344CB8AC3E}">
@@ -3491,6 +3521,36 @@
           <a:chExt cx="0" cy="0"/>
         </a:xfrm>
       </p:grpSpPr>
+      <p:pic>
+        <p:nvPicPr>
+          <p:cNvPr id="3" name="图片 2">
+            <a:extLst>
+              <a:ext uri="{FF2B5EF4-FFF2-40B4-BE49-F238E27FC236}">
+                <a16:creationId xmlns:a16="http://schemas.microsoft.com/office/drawing/2014/main" id="{1F0742AE-996A-246F-675C-0BBB96461F9D}"/>
+              </a:ext>
+            </a:extLst>
+          </p:cNvPr>
+          <p:cNvPicPr>
+            <a:picLocks noChangeAspect="1"/>
+          </p:cNvPicPr>
+          <p:nvPr/>
+        </p:nvPicPr>
+        <p:blipFill>
+          <a:blip r:embed="rId2"/>
+          <a:stretch>
+            <a:fillRect/>
+          </a:stretch>
+        </p:blipFill>
+        <p:spPr>
+          <a:xfrm>
+            <a:off x="0" y="1454164"/>
+            <a:ext cx="12192000" cy="3949672"/>
+          </a:xfrm>
+          <a:prstGeom prst="rect">
+            <a:avLst/>
+          </a:prstGeom>
+        </p:spPr>
+      </p:pic>
     </p:spTree>
     <p:extLst>
       <p:ext uri="{BB962C8B-B14F-4D97-AF65-F5344CB8AC3E}">
@@ -3527,6 +3587,36 @@
           <a:chExt cx="0" cy="0"/>
         </a:xfrm>
       </p:grpSpPr>
+      <p:pic>
+        <p:nvPicPr>
+          <p:cNvPr id="3" name="图片 2">
+            <a:extLst>
+              <a:ext uri="{FF2B5EF4-FFF2-40B4-BE49-F238E27FC236}">
+                <a16:creationId xmlns:a16="http://schemas.microsoft.com/office/drawing/2014/main" id="{929106F3-9A5C-93C3-575C-E66C8B5C97F6}"/>
+              </a:ext>
+            </a:extLst>
+          </p:cNvPr>
+          <p:cNvPicPr>
+            <a:picLocks noChangeAspect="1"/>
+          </p:cNvPicPr>
+          <p:nvPr/>
+        </p:nvPicPr>
+        <p:blipFill>
+          <a:blip r:embed="rId2"/>
+          <a:stretch>
+            <a:fillRect/>
+          </a:stretch>
+        </p:blipFill>
+        <p:spPr>
+          <a:xfrm>
+            <a:off x="0" y="901390"/>
+            <a:ext cx="12192000" cy="5055220"/>
+          </a:xfrm>
+          <a:prstGeom prst="rect">
+            <a:avLst/>
+          </a:prstGeom>
+        </p:spPr>
+      </p:pic>
     </p:spTree>
     <p:extLst>
       <p:ext uri="{BB962C8B-B14F-4D97-AF65-F5344CB8AC3E}">
@@ -3563,6 +3653,36 @@
           <a:chExt cx="0" cy="0"/>
         </a:xfrm>
       </p:grpSpPr>
+      <p:pic>
+        <p:nvPicPr>
+          <p:cNvPr id="3" name="图片 2">
+            <a:extLst>
+              <a:ext uri="{FF2B5EF4-FFF2-40B4-BE49-F238E27FC236}">
+                <a16:creationId xmlns:a16="http://schemas.microsoft.com/office/drawing/2014/main" id="{DDE7AE3D-09BE-6072-D61F-2373941C7610}"/>
+              </a:ext>
+            </a:extLst>
+          </p:cNvPr>
+          <p:cNvPicPr>
+            <a:picLocks noChangeAspect="1"/>
+          </p:cNvPicPr>
+          <p:nvPr/>
+        </p:nvPicPr>
+        <p:blipFill>
+          <a:blip r:embed="rId2"/>
+          <a:stretch>
+            <a:fillRect/>
+          </a:stretch>
+        </p:blipFill>
+        <p:spPr>
+          <a:xfrm>
+            <a:off x="0" y="860588"/>
+            <a:ext cx="12192000" cy="5136823"/>
+          </a:xfrm>
+          <a:prstGeom prst="rect">
+            <a:avLst/>
+          </a:prstGeom>
+        </p:spPr>
+      </p:pic>
     </p:spTree>
     <p:extLst>
       <p:ext uri="{BB962C8B-B14F-4D97-AF65-F5344CB8AC3E}">

</xml_diff>